<commit_message>
Z naniesionymi poprawkami od NK i WG.
</commit_message>
<xml_diff>
--- a/1.4 pbb.pptx
+++ b/1.4 pbb.pptx
@@ -282,7 +282,7 @@
             <a:fld id="{A1F85679-1472-4A9B-97D7-E2DEB0129FB2}" type="datetimeFigureOut">
               <a:rPr lang="pl-PL" smtClean="0"/>
               <a:pPr/>
-              <a:t>2017-12-08</a:t>
+              <a:t>2017-12-09</a:t>
             </a:fld>
             <a:endParaRPr lang="pl-PL"/>
           </a:p>
@@ -2113,7 +2113,7 @@
             <a:fld id="{66221E02-25CB-4963-84BC-0813985E7D90}" type="datetimeFigureOut">
               <a:rPr lang="pl-PL" smtClean="0"/>
               <a:pPr/>
-              <a:t>2017-12-08</a:t>
+              <a:t>2017-12-09</a:t>
             </a:fld>
             <a:endParaRPr lang="pl-PL"/>
           </a:p>
@@ -2278,7 +2278,7 @@
             <a:fld id="{66221E02-25CB-4963-84BC-0813985E7D90}" type="datetimeFigureOut">
               <a:rPr lang="pl-PL" smtClean="0"/>
               <a:pPr/>
-              <a:t>2017-12-08</a:t>
+              <a:t>2017-12-09</a:t>
             </a:fld>
             <a:endParaRPr lang="pl-PL"/>
           </a:p>
@@ -2453,7 +2453,7 @@
             <a:fld id="{66221E02-25CB-4963-84BC-0813985E7D90}" type="datetimeFigureOut">
               <a:rPr lang="pl-PL" smtClean="0"/>
               <a:pPr/>
-              <a:t>2017-12-08</a:t>
+              <a:t>2017-12-09</a:t>
             </a:fld>
             <a:endParaRPr lang="pl-PL"/>
           </a:p>
@@ -2618,7 +2618,7 @@
             <a:fld id="{66221E02-25CB-4963-84BC-0813985E7D90}" type="datetimeFigureOut">
               <a:rPr lang="pl-PL" smtClean="0"/>
               <a:pPr/>
-              <a:t>2017-12-08</a:t>
+              <a:t>2017-12-09</a:t>
             </a:fld>
             <a:endParaRPr lang="pl-PL"/>
           </a:p>
@@ -2860,7 +2860,7 @@
             <a:fld id="{66221E02-25CB-4963-84BC-0813985E7D90}" type="datetimeFigureOut">
               <a:rPr lang="pl-PL" smtClean="0"/>
               <a:pPr/>
-              <a:t>2017-12-08</a:t>
+              <a:t>2017-12-09</a:t>
             </a:fld>
             <a:endParaRPr lang="pl-PL"/>
           </a:p>
@@ -3142,7 +3142,7 @@
             <a:fld id="{66221E02-25CB-4963-84BC-0813985E7D90}" type="datetimeFigureOut">
               <a:rPr lang="pl-PL" smtClean="0"/>
               <a:pPr/>
-              <a:t>2017-12-08</a:t>
+              <a:t>2017-12-09</a:t>
             </a:fld>
             <a:endParaRPr lang="pl-PL"/>
           </a:p>
@@ -3558,7 +3558,7 @@
             <a:fld id="{66221E02-25CB-4963-84BC-0813985E7D90}" type="datetimeFigureOut">
               <a:rPr lang="pl-PL" smtClean="0"/>
               <a:pPr/>
-              <a:t>2017-12-08</a:t>
+              <a:t>2017-12-09</a:t>
             </a:fld>
             <a:endParaRPr lang="pl-PL"/>
           </a:p>
@@ -3672,7 +3672,7 @@
             <a:fld id="{66221E02-25CB-4963-84BC-0813985E7D90}" type="datetimeFigureOut">
               <a:rPr lang="pl-PL" smtClean="0"/>
               <a:pPr/>
-              <a:t>2017-12-08</a:t>
+              <a:t>2017-12-09</a:t>
             </a:fld>
             <a:endParaRPr lang="pl-PL"/>
           </a:p>
@@ -3764,7 +3764,7 @@
             <a:fld id="{66221E02-25CB-4963-84BC-0813985E7D90}" type="datetimeFigureOut">
               <a:rPr lang="pl-PL" smtClean="0"/>
               <a:pPr/>
-              <a:t>2017-12-08</a:t>
+              <a:t>2017-12-09</a:t>
             </a:fld>
             <a:endParaRPr lang="pl-PL"/>
           </a:p>
@@ -4036,7 +4036,7 @@
             <a:fld id="{66221E02-25CB-4963-84BC-0813985E7D90}" type="datetimeFigureOut">
               <a:rPr lang="pl-PL" smtClean="0"/>
               <a:pPr/>
-              <a:t>2017-12-08</a:t>
+              <a:t>2017-12-09</a:t>
             </a:fld>
             <a:endParaRPr lang="pl-PL"/>
           </a:p>
@@ -4285,7 +4285,7 @@
             <a:fld id="{66221E02-25CB-4963-84BC-0813985E7D90}" type="datetimeFigureOut">
               <a:rPr lang="pl-PL" smtClean="0"/>
               <a:pPr/>
-              <a:t>2017-12-08</a:t>
+              <a:t>2017-12-09</a:t>
             </a:fld>
             <a:endParaRPr lang="pl-PL"/>
           </a:p>
@@ -4493,7 +4493,7 @@
             <a:fld id="{66221E02-25CB-4963-84BC-0813985E7D90}" type="datetimeFigureOut">
               <a:rPr lang="pl-PL" smtClean="0"/>
               <a:pPr/>
-              <a:t>2017-12-08</a:t>
+              <a:t>2017-12-09</a:t>
             </a:fld>
             <a:endParaRPr lang="pl-PL"/>
           </a:p>
@@ -7111,12 +7111,12 @@
               <a:t>Zaadaptowano na </a:t>
             </a:r>
             <a:r>
-              <a:rPr lang="pl-PL" sz="1400" dirty="0" err="1"/>
-              <a:t>posttawie</a:t>
+              <a:rPr lang="pl-PL" sz="1400" dirty="0" smtClean="0"/>
+              <a:t>podstawie:</a:t>
             </a:r>
             <a:r>
               <a:rPr lang="pl-PL" sz="1400" dirty="0"/>
-              <a:t>:</a:t>
+              <a:t/>
             </a:r>
             <a:br>
               <a:rPr lang="pl-PL" sz="1400" dirty="0"/>
@@ -7201,7 +7201,7 @@
       </p:sp>
       <p:pic>
         <p:nvPicPr>
-          <p:cNvPr id="4" name="Obraz 3" descr="DPL_ propozycja (1) (1).png"/>
+          <p:cNvPr id="5" name="Obraz 4" descr="rownowaga.png"/>
           <p:cNvPicPr>
             <a:picLocks noChangeAspect="1"/>
           </p:cNvPicPr>
@@ -7215,8 +7215,8 @@
         </p:blipFill>
         <p:spPr>
           <a:xfrm>
-            <a:off x="1187625" y="129672"/>
-            <a:ext cx="6624736" cy="6194656"/>
+            <a:off x="1115616" y="72008"/>
+            <a:ext cx="6739676" cy="6309320"/>
           </a:xfrm>
           <a:prstGeom prst="rect">
             <a:avLst/>
@@ -11944,8 +11944,8 @@
                     <a:lstStyle/>
                     <a:p>
                       <a:r>
-                        <a:rPr lang="pl-PL" sz="2800" dirty="0" err="1"/>
-                        <a:t>Procedure</a:t>
+                        <a:rPr lang="pl-PL" sz="2800" dirty="0" smtClean="0"/>
+                        <a:t>Procedura</a:t>
                       </a:r>
                       <a:endParaRPr lang="pl-PL" sz="2800" dirty="0"/>
                     </a:p>
@@ -11958,8 +11958,8 @@
                     <a:lstStyle/>
                     <a:p>
                       <a:r>
-                        <a:rPr lang="pl-PL" sz="2800" dirty="0" err="1"/>
-                        <a:t>Reagents</a:t>
+                        <a:rPr lang="pl-PL" sz="2800" dirty="0" smtClean="0"/>
+                        <a:t>Odczynniki</a:t>
                       </a:r>
                       <a:endParaRPr lang="pl-PL" sz="2800" dirty="0"/>
                     </a:p>

</xml_diff>